<commit_message>
Improving docu for complex example
</commit_message>
<xml_diff>
--- a/ETLBoxDocu/presentations/Introduction.pptx
+++ b/ETLBoxDocu/presentations/Introduction.pptx
@@ -208,7 +208,7 @@
           <a:p>
             <a:fld id="{4DD2A6FC-68FA-4ADF-89F3-F8F0ACEA0A5A}" type="datetimeFigureOut">
               <a:rPr lang="en-US" smtClean="0"/>
-              <a:t>10/22/18</a:t>
+              <a:t>12/28/19</a:t>
             </a:fld>
             <a:endParaRPr lang="en-US"/>
           </a:p>
@@ -366,7 +366,7 @@
           <a:p>
             <a:fld id="{4BE8C318-2C24-42CC-A559-AB805B40BD24}" type="slidenum">
               <a:rPr lang="en-US" smtClean="0"/>
-              <a:t>‹Nr.›</a:t>
+              <a:t>‹#›</a:t>
             </a:fld>
             <a:endParaRPr lang="en-US"/>
           </a:p>
@@ -562,14 +562,6 @@
 <file path=ppt/slideLayouts/slideLayout1.xml><?xml version="1.0" encoding="utf-8"?>
 <p:sldLayout xmlns:a="http://schemas.openxmlformats.org/drawingml/2006/main" xmlns:r="http://schemas.openxmlformats.org/officeDocument/2006/relationships" xmlns:p="http://schemas.openxmlformats.org/presentationml/2006/main" showMasterSp="0" type="title" preserve="1">
   <p:cSld name="Title Slide">
-    <p:bg>
-      <p:bgPr>
-        <a:solidFill>
-          <a:schemeClr val="bg2"/>
-        </a:solidFill>
-        <a:effectLst/>
-      </p:bgPr>
-    </p:bg>
     <p:spTree>
       <p:nvGrpSpPr>
         <p:cNvPr id="1" name=""/>
@@ -728,7 +720,7 @@
           <a:p>
             <a:fld id="{2F283A50-9E83-4842-82CA-04C02D95BB20}" type="datetimeFigureOut">
               <a:rPr lang="en-US" smtClean="0"/>
-              <a:t>10/22/18</a:t>
+              <a:t>12/28/19</a:t>
             </a:fld>
             <a:endParaRPr lang="en-US"/>
           </a:p>
@@ -796,7 +788,7 @@
           <a:p>
             <a:fld id="{AAB993DC-A541-46CF-BDDB-965FA36EA57E}" type="slidenum">
               <a:rPr lang="en-US" smtClean="0"/>
-              <a:t>‹Nr.›</a:t>
+              <a:t>‹#›</a:t>
             </a:fld>
             <a:endParaRPr lang="en-US"/>
           </a:p>
@@ -939,7 +931,7 @@
     </p:extLst>
   </p:cSld>
   <p:clrMapOvr>
-    <a:overrideClrMapping bg1="lt1" tx1="dk1" bg2="lt2" tx2="dk2" accent1="accent1" accent2="accent2" accent3="accent3" accent4="accent4" accent5="accent5" accent6="accent6" hlink="hlink" folHlink="folHlink"/>
+    <a:masterClrMapping/>
   </p:clrMapOvr>
 </p:sldLayout>
 </file>
@@ -1058,7 +1050,7 @@
           <a:p>
             <a:fld id="{2F283A50-9E83-4842-82CA-04C02D95BB20}" type="datetimeFigureOut">
               <a:rPr lang="en-US" smtClean="0"/>
-              <a:t>10/22/18</a:t>
+              <a:t>12/28/19</a:t>
             </a:fld>
             <a:endParaRPr lang="en-US"/>
           </a:p>
@@ -1100,7 +1092,7 @@
           <a:p>
             <a:fld id="{AAB993DC-A541-46CF-BDDB-965FA36EA57E}" type="slidenum">
               <a:rPr lang="en-US" smtClean="0"/>
-              <a:t>‹Nr.›</a:t>
+              <a:t>‹#›</a:t>
             </a:fld>
             <a:endParaRPr lang="en-US"/>
           </a:p>
@@ -1238,7 +1230,7 @@
           <a:p>
             <a:fld id="{2F283A50-9E83-4842-82CA-04C02D95BB20}" type="datetimeFigureOut">
               <a:rPr lang="en-US" smtClean="0"/>
-              <a:t>10/22/18</a:t>
+              <a:t>12/28/19</a:t>
             </a:fld>
             <a:endParaRPr lang="en-US"/>
           </a:p>
@@ -1280,7 +1272,7 @@
           <a:p>
             <a:fld id="{AAB993DC-A541-46CF-BDDB-965FA36EA57E}" type="slidenum">
               <a:rPr lang="en-US" smtClean="0"/>
-              <a:t>‹Nr.›</a:t>
+              <a:t>‹#›</a:t>
             </a:fld>
             <a:endParaRPr lang="en-US"/>
           </a:p>
@@ -1408,7 +1400,7 @@
           <a:p>
             <a:fld id="{2F283A50-9E83-4842-82CA-04C02D95BB20}" type="datetimeFigureOut">
               <a:rPr lang="en-US" smtClean="0"/>
-              <a:t>10/22/18</a:t>
+              <a:t>12/28/19</a:t>
             </a:fld>
             <a:endParaRPr lang="en-US"/>
           </a:p>
@@ -1450,7 +1442,7 @@
           <a:p>
             <a:fld id="{AAB993DC-A541-46CF-BDDB-965FA36EA57E}" type="slidenum">
               <a:rPr lang="en-US" smtClean="0"/>
-              <a:t>‹Nr.›</a:t>
+              <a:t>‹#›</a:t>
             </a:fld>
             <a:endParaRPr lang="en-US"/>
           </a:p>
@@ -1472,11 +1464,6 @@
 <file path=ppt/slideLayouts/slideLayout3.xml><?xml version="1.0" encoding="utf-8"?>
 <p:sldLayout xmlns:a="http://schemas.openxmlformats.org/drawingml/2006/main" xmlns:r="http://schemas.openxmlformats.org/officeDocument/2006/relationships" xmlns:p="http://schemas.openxmlformats.org/presentationml/2006/main" showMasterSp="0" type="secHead" preserve="1">
   <p:cSld name="Section Header">
-    <p:bg>
-      <p:bgRef idx="1001">
-        <a:schemeClr val="bg2"/>
-      </p:bgRef>
-    </p:bg>
     <p:spTree>
       <p:nvGrpSpPr>
         <p:cNvPr id="1" name=""/>
@@ -1685,7 +1672,7 @@
           <a:p>
             <a:fld id="{2F283A50-9E83-4842-82CA-04C02D95BB20}" type="datetimeFigureOut">
               <a:rPr lang="en-US" smtClean="0"/>
-              <a:t>10/22/18</a:t>
+              <a:t>12/28/19</a:t>
             </a:fld>
             <a:endParaRPr lang="en-US"/>
           </a:p>
@@ -1753,7 +1740,7 @@
           <a:p>
             <a:fld id="{AAB993DC-A541-46CF-BDDB-965FA36EA57E}" type="slidenum">
               <a:rPr lang="en-US" smtClean="0"/>
-              <a:t>‹Nr.›</a:t>
+              <a:t>‹#›</a:t>
             </a:fld>
             <a:endParaRPr lang="en-US"/>
           </a:p>
@@ -1823,7 +1810,7 @@
     </p:extLst>
   </p:cSld>
   <p:clrMapOvr>
-    <a:overrideClrMapping bg1="dk1" tx1="lt1" bg2="dk2" tx2="lt2" accent1="accent1" accent2="accent2" accent3="accent3" accent4="accent4" accent5="accent5" accent6="accent6" hlink="hlink" folHlink="folHlink"/>
+    <a:masterClrMapping/>
   </p:clrMapOvr>
 </p:sldLayout>
 </file>
@@ -2079,7 +2066,7 @@
           <a:p>
             <a:fld id="{2F283A50-9E83-4842-82CA-04C02D95BB20}" type="datetimeFigureOut">
               <a:rPr lang="en-US" smtClean="0"/>
-              <a:t>10/22/18</a:t>
+              <a:t>12/28/19</a:t>
             </a:fld>
             <a:endParaRPr lang="en-US"/>
           </a:p>
@@ -2121,7 +2108,7 @@
           <a:p>
             <a:fld id="{AAB993DC-A541-46CF-BDDB-965FA36EA57E}" type="slidenum">
               <a:rPr lang="en-US" smtClean="0"/>
-              <a:t>‹Nr.›</a:t>
+              <a:t>‹#›</a:t>
             </a:fld>
             <a:endParaRPr lang="en-US"/>
           </a:p>
@@ -2556,7 +2543,7 @@
           <a:p>
             <a:fld id="{2F283A50-9E83-4842-82CA-04C02D95BB20}" type="datetimeFigureOut">
               <a:rPr lang="en-US" smtClean="0"/>
-              <a:t>10/22/18</a:t>
+              <a:t>12/28/19</a:t>
             </a:fld>
             <a:endParaRPr lang="en-US"/>
           </a:p>
@@ -2598,7 +2585,7 @@
           <a:p>
             <a:fld id="{AAB993DC-A541-46CF-BDDB-965FA36EA57E}" type="slidenum">
               <a:rPr lang="en-US" smtClean="0"/>
-              <a:t>‹Nr.›</a:t>
+              <a:t>‹#›</a:t>
             </a:fld>
             <a:endParaRPr lang="en-US"/>
           </a:p>
@@ -2674,7 +2661,7 @@
           <a:p>
             <a:fld id="{2F283A50-9E83-4842-82CA-04C02D95BB20}" type="datetimeFigureOut">
               <a:rPr lang="en-US" smtClean="0"/>
-              <a:t>10/22/18</a:t>
+              <a:t>12/28/19</a:t>
             </a:fld>
             <a:endParaRPr lang="en-US"/>
           </a:p>
@@ -2716,7 +2703,7 @@
           <a:p>
             <a:fld id="{AAB993DC-A541-46CF-BDDB-965FA36EA57E}" type="slidenum">
               <a:rPr lang="en-US" smtClean="0"/>
-              <a:t>‹Nr.›</a:t>
+              <a:t>‹#›</a:t>
             </a:fld>
             <a:endParaRPr lang="en-US"/>
           </a:p>
@@ -2769,7 +2756,7 @@
           <a:p>
             <a:fld id="{2F283A50-9E83-4842-82CA-04C02D95BB20}" type="datetimeFigureOut">
               <a:rPr lang="en-US" smtClean="0"/>
-              <a:t>10/22/18</a:t>
+              <a:t>12/28/19</a:t>
             </a:fld>
             <a:endParaRPr lang="en-US"/>
           </a:p>
@@ -2811,7 +2798,7 @@
           <a:p>
             <a:fld id="{AAB993DC-A541-46CF-BDDB-965FA36EA57E}" type="slidenum">
               <a:rPr lang="en-US" smtClean="0"/>
-              <a:t>‹Nr.›</a:t>
+              <a:t>‹#›</a:t>
             </a:fld>
             <a:endParaRPr lang="en-US"/>
           </a:p>
@@ -2833,6 +2820,11 @@
 <file path=ppt/slideLayouts/slideLayout8.xml><?xml version="1.0" encoding="utf-8"?>
 <p:sldLayout xmlns:a="http://schemas.openxmlformats.org/drawingml/2006/main" xmlns:r="http://schemas.openxmlformats.org/officeDocument/2006/relationships" xmlns:p="http://schemas.openxmlformats.org/presentationml/2006/main" showMasterSp="0" type="objTx" preserve="1">
   <p:cSld name="Content with Caption">
+    <p:bg>
+      <p:bgRef idx="1001">
+        <a:schemeClr val="bg1"/>
+      </p:bgRef>
+    </p:bg>
     <p:spTree>
       <p:nvGrpSpPr>
         <p:cNvPr id="1" name=""/>
@@ -2919,10 +2911,9 @@
           </a:lstStyle>
           <a:p>
             <a:r>
-              <a:rPr lang="en-US"/>
+              <a:rPr lang="en-US" dirty="0"/>
               <a:t>Click to edit Master title style</a:t>
             </a:r>
-            <a:endParaRPr lang="en-US" dirty="0"/>
           </a:p>
         </p:txBody>
       </p:sp>
@@ -3115,7 +3106,7 @@
           <a:p>
             <a:fld id="{2F283A50-9E83-4842-82CA-04C02D95BB20}" type="datetimeFigureOut">
               <a:rPr lang="en-US" smtClean="0"/>
-              <a:t>10/22/18</a:t>
+              <a:t>12/28/19</a:t>
             </a:fld>
             <a:endParaRPr lang="en-US"/>
           </a:p>
@@ -3183,7 +3174,7 @@
           <a:p>
             <a:fld id="{AAB993DC-A541-46CF-BDDB-965FA36EA57E}" type="slidenum">
               <a:rPr lang="en-US" smtClean="0"/>
-              <a:t>‹Nr.›</a:t>
+              <a:t>‹#›</a:t>
             </a:fld>
             <a:endParaRPr lang="en-US"/>
           </a:p>
@@ -3235,7 +3226,7 @@
     </p:extLst>
   </p:cSld>
   <p:clrMapOvr>
-    <a:masterClrMapping/>
+    <a:overrideClrMapping bg1="lt1" tx1="dk1" bg2="lt2" tx2="dk2" accent1="accent1" accent2="accent2" accent3="accent3" accent4="accent4" accent5="accent5" accent6="accent6" hlink="hlink" folHlink="folHlink"/>
   </p:clrMapOvr>
 </p:sldLayout>
 </file>
@@ -3503,7 +3494,7 @@
           <a:p>
             <a:fld id="{2F283A50-9E83-4842-82CA-04C02D95BB20}" type="datetimeFigureOut">
               <a:rPr lang="en-US" smtClean="0"/>
-              <a:t>10/22/18</a:t>
+              <a:t>12/28/19</a:t>
             </a:fld>
             <a:endParaRPr lang="en-US"/>
           </a:p>
@@ -3571,7 +3562,7 @@
           <a:p>
             <a:fld id="{AAB993DC-A541-46CF-BDDB-965FA36EA57E}" type="slidenum">
               <a:rPr lang="en-US" smtClean="0"/>
-              <a:t>‹Nr.›</a:t>
+              <a:t>‹#›</a:t>
             </a:fld>
             <a:endParaRPr lang="en-US"/>
           </a:p>
@@ -3632,12 +3623,9 @@
 <p:sldMaster xmlns:a="http://schemas.openxmlformats.org/drawingml/2006/main" xmlns:r="http://schemas.openxmlformats.org/officeDocument/2006/relationships" xmlns:p="http://schemas.openxmlformats.org/presentationml/2006/main">
   <p:cSld>
     <p:bg>
-      <p:bgPr>
-        <a:solidFill>
-          <a:schemeClr val="bg2"/>
-        </a:solidFill>
-        <a:effectLst/>
-      </p:bgPr>
+      <p:bgRef idx="1001">
+        <a:schemeClr val="bg1"/>
+      </p:bgRef>
     </p:bg>
     <p:spTree>
       <p:nvGrpSpPr>
@@ -3781,7 +3769,7 @@
           <a:p>
             <a:fld id="{2F283A50-9E83-4842-82CA-04C02D95BB20}" type="datetimeFigureOut">
               <a:rPr lang="en-US" smtClean="0"/>
-              <a:t>10/22/18</a:t>
+              <a:t>12/28/19</a:t>
             </a:fld>
             <a:endParaRPr lang="en-US"/>
           </a:p>
@@ -3855,7 +3843,7 @@
           <a:p>
             <a:fld id="{AAB993DC-A541-46CF-BDDB-965FA36EA57E}" type="slidenum">
               <a:rPr lang="en-US" smtClean="0"/>
-              <a:t>‹Nr.›</a:t>
+              <a:t>‹#›</a:t>
             </a:fld>
             <a:endParaRPr lang="en-US"/>
           </a:p>
@@ -4227,7 +4215,7 @@
       </a:lvl9pPr>
     </p:otherStyle>
   </p:txStyles>
-  <p:extLst mod="1">
+  <p:extLst>
     <p:ext uri="{27BBF7A9-308A-43DC-89C8-2F10F3537804}">
       <p15:sldGuideLst xmlns:p15="http://schemas.microsoft.com/office/powerpoint/2012/main">
         <p15:guide id="1" orient="horz" pos="1368">
@@ -11723,7 +11711,7 @@
         </p:blipFill>
         <p:spPr>
           <a:xfrm>
-            <a:off x="823192" y="68465"/>
+            <a:off x="1786012" y="100754"/>
             <a:ext cx="3305175" cy="2419350"/>
           </a:xfrm>
           <a:prstGeom prst="rect">
@@ -11771,7 +11759,7 @@
         </p:blipFill>
         <p:spPr>
           <a:xfrm>
-            <a:off x="8400256" y="5351252"/>
+            <a:off x="6407889" y="5034742"/>
             <a:ext cx="3019425" cy="1276350"/>
           </a:xfrm>
           <a:prstGeom prst="rect">
@@ -11795,7 +11783,7 @@
         </p:blipFill>
         <p:spPr>
           <a:xfrm>
-            <a:off x="8171655" y="764704"/>
+            <a:off x="5927197" y="964061"/>
             <a:ext cx="3476625" cy="1314450"/>
           </a:xfrm>
           <a:prstGeom prst="rect">
@@ -11811,8 +11799,8 @@
         </p:nvSpPr>
         <p:spPr>
           <a:xfrm>
-            <a:off x="1911501" y="3315206"/>
-            <a:ext cx="1128556" cy="585939"/>
+            <a:off x="1716707" y="3315206"/>
+            <a:ext cx="1323350" cy="585939"/>
           </a:xfrm>
           <a:prstGeom prst="rect">
             <a:avLst/>
@@ -11839,7 +11827,7 @@
             <a:pPr algn="ctr"/>
             <a:r>
               <a:rPr lang="en-US" sz="1050" dirty="0" err="1"/>
-              <a:t>RowTrans</a:t>
+              <a:t>RowTransformation</a:t>
             </a:r>
             <a:endParaRPr lang="en-US" sz="1050" dirty="0"/>
           </a:p>
@@ -11847,7 +11835,7 @@
             <a:pPr algn="ctr"/>
             <a:r>
               <a:rPr lang="en-US" sz="1050" dirty="0"/>
-              <a:t>CSV into Order object</a:t>
+              <a:t>String[] to Order</a:t>
             </a:r>
           </a:p>
         </p:txBody>
@@ -11856,15 +11844,16 @@
         <p:nvCxnSpPr>
           <p:cNvPr id="24" name="Straight Arrow Connector 23"/>
           <p:cNvCxnSpPr>
-            <a:stCxn id="4" idx="2"/>
+            <a:cxnSpLocks/>
+            <a:stCxn id="37" idx="3"/>
             <a:endCxn id="22" idx="0"/>
           </p:cNvCxnSpPr>
           <p:nvPr/>
         </p:nvCxnSpPr>
         <p:spPr>
-          <a:xfrm flipH="1">
-            <a:off x="2475779" y="2487815"/>
-            <a:ext cx="1" cy="827391"/>
+          <a:xfrm>
+            <a:off x="2378382" y="2770355"/>
+            <a:ext cx="0" cy="544851"/>
           </a:xfrm>
           <a:prstGeom prst="straightConnector1">
             <a:avLst/>
@@ -11892,15 +11881,16 @@
         <p:nvCxnSpPr>
           <p:cNvPr id="27" name="Straight Arrow Connector 26"/>
           <p:cNvCxnSpPr>
+            <a:cxnSpLocks/>
             <a:stCxn id="22" idx="3"/>
             <a:endCxn id="36" idx="1"/>
           </p:cNvCxnSpPr>
           <p:nvPr/>
         </p:nvCxnSpPr>
         <p:spPr>
-          <a:xfrm>
-            <a:off x="3040057" y="3608176"/>
-            <a:ext cx="1155499" cy="664"/>
+          <a:xfrm flipV="1">
+            <a:off x="3040057" y="3607268"/>
+            <a:ext cx="718768" cy="908"/>
           </a:xfrm>
           <a:prstGeom prst="straightConnector1">
             <a:avLst/>
@@ -11928,14 +11918,16 @@
         <p:nvCxnSpPr>
           <p:cNvPr id="32" name="Straight Arrow Connector 31"/>
           <p:cNvCxnSpPr>
+            <a:cxnSpLocks/>
+            <a:stCxn id="38" idx="1"/>
             <a:endCxn id="36" idx="2"/>
           </p:cNvCxnSpPr>
           <p:nvPr/>
         </p:nvCxnSpPr>
         <p:spPr>
           <a:xfrm flipV="1">
-            <a:off x="4393923" y="3851984"/>
-            <a:ext cx="365911" cy="596984"/>
+            <a:off x="4323103" y="3850412"/>
+            <a:ext cx="0" cy="498468"/>
           </a:xfrm>
           <a:prstGeom prst="straightConnector1">
             <a:avLst/>
@@ -11967,7 +11959,7 @@
         </p:nvSpPr>
         <p:spPr>
           <a:xfrm>
-            <a:off x="4195556" y="3365696"/>
+            <a:off x="3758825" y="3364124"/>
             <a:ext cx="1128556" cy="486288"/>
           </a:xfrm>
           <a:prstGeom prst="rect">
@@ -12008,7 +12000,7 @@
         </p:nvSpPr>
         <p:spPr>
           <a:xfrm>
-            <a:off x="1976162" y="2275883"/>
+            <a:off x="1910330" y="2266299"/>
             <a:ext cx="936104" cy="504056"/>
           </a:xfrm>
           <a:prstGeom prst="can">
@@ -12050,7 +12042,7 @@
         </p:nvSpPr>
         <p:spPr>
           <a:xfrm>
-            <a:off x="3438601" y="4371332"/>
+            <a:off x="3855051" y="4348880"/>
             <a:ext cx="936104" cy="504056"/>
           </a:xfrm>
           <a:prstGeom prst="can">
@@ -12092,7 +12084,7 @@
         </p:nvSpPr>
         <p:spPr>
           <a:xfrm>
-            <a:off x="2187609" y="2732686"/>
+            <a:off x="1803396" y="2890250"/>
             <a:ext cx="679994" cy="261610"/>
           </a:xfrm>
           <a:prstGeom prst="rect">
@@ -12115,42 +12107,13 @@
       </p:sp>
       <p:sp>
         <p:nvSpPr>
-          <p:cNvPr id="48" name="TextBox 47"/>
-          <p:cNvSpPr txBox="1"/>
-          <p:nvPr/>
-        </p:nvSpPr>
-        <p:spPr>
-          <a:xfrm>
-            <a:off x="2187609" y="3062367"/>
-            <a:ext cx="679994" cy="261610"/>
-          </a:xfrm>
-          <a:prstGeom prst="rect">
-            <a:avLst/>
-          </a:prstGeom>
-          <a:noFill/>
-        </p:spPr>
-        <p:txBody>
-          <a:bodyPr wrap="none" rtlCol="0">
-            <a:spAutoFit/>
-          </a:bodyPr>
-          <a:lstStyle/>
-          <a:p>
-            <a:r>
-              <a:rPr lang="en-US" sz="1050" dirty="0"/>
-              <a:t>String[]</a:t>
-            </a:r>
-          </a:p>
-        </p:txBody>
-      </p:sp>
-      <p:sp>
-        <p:nvSpPr>
           <p:cNvPr id="49" name="TextBox 48"/>
           <p:cNvSpPr txBox="1"/>
           <p:nvPr/>
         </p:nvSpPr>
         <p:spPr>
           <a:xfrm>
-            <a:off x="2963721" y="3354924"/>
+            <a:off x="3158716" y="3365031"/>
             <a:ext cx="559769" cy="253916"/>
           </a:xfrm>
           <a:prstGeom prst="rect">
@@ -12173,42 +12136,13 @@
       </p:sp>
       <p:sp>
         <p:nvSpPr>
-          <p:cNvPr id="51" name="TextBox 50"/>
-          <p:cNvSpPr txBox="1"/>
-          <p:nvPr/>
-        </p:nvSpPr>
-        <p:spPr>
-          <a:xfrm>
-            <a:off x="3727039" y="3365696"/>
-            <a:ext cx="559769" cy="253916"/>
-          </a:xfrm>
-          <a:prstGeom prst="rect">
-            <a:avLst/>
-          </a:prstGeom>
-          <a:noFill/>
-        </p:spPr>
-        <p:txBody>
-          <a:bodyPr wrap="none" rtlCol="0">
-            <a:spAutoFit/>
-          </a:bodyPr>
-          <a:lstStyle/>
-          <a:p>
-            <a:r>
-              <a:rPr lang="en-US" sz="1050" dirty="0"/>
-              <a:t>Order</a:t>
-            </a:r>
-          </a:p>
-        </p:txBody>
-      </p:sp>
-      <p:sp>
-        <p:nvSpPr>
           <p:cNvPr id="57" name="TextBox 56"/>
           <p:cNvSpPr txBox="1"/>
           <p:nvPr/>
         </p:nvSpPr>
         <p:spPr>
           <a:xfrm>
-            <a:off x="4314511" y="3851984"/>
+            <a:off x="3521531" y="3990457"/>
             <a:ext cx="809837" cy="253916"/>
           </a:xfrm>
           <a:prstGeom prst="rect">
@@ -12231,42 +12165,13 @@
       </p:sp>
       <p:sp>
         <p:nvSpPr>
-          <p:cNvPr id="58" name="TextBox 57"/>
-          <p:cNvSpPr txBox="1"/>
-          <p:nvPr/>
-        </p:nvSpPr>
-        <p:spPr>
-          <a:xfrm>
-            <a:off x="4179549" y="4211314"/>
-            <a:ext cx="809837" cy="253916"/>
-          </a:xfrm>
-          <a:prstGeom prst="rect">
-            <a:avLst/>
-          </a:prstGeom>
-          <a:noFill/>
-        </p:spPr>
-        <p:txBody>
-          <a:bodyPr wrap="none" rtlCol="0">
-            <a:spAutoFit/>
-          </a:bodyPr>
-          <a:lstStyle/>
-          <a:p>
-            <a:r>
-              <a:rPr lang="en-US" sz="1050" dirty="0"/>
-              <a:t>Customer</a:t>
-            </a:r>
-          </a:p>
-        </p:txBody>
-      </p:sp>
-      <p:sp>
-        <p:nvSpPr>
           <p:cNvPr id="61" name="Rectangle 60"/>
           <p:cNvSpPr/>
           <p:nvPr/>
         </p:nvSpPr>
         <p:spPr>
           <a:xfrm>
-            <a:off x="6398802" y="3365031"/>
+            <a:off x="5431229" y="3364124"/>
             <a:ext cx="1128556" cy="486288"/>
           </a:xfrm>
           <a:prstGeom prst="rect">
@@ -12297,6 +12202,13 @@
               <a:t>Multicast</a:t>
             </a:r>
           </a:p>
+          <a:p>
+            <a:pPr algn="ctr"/>
+            <a:r>
+              <a:rPr lang="en-US" sz="1050" dirty="0"/>
+              <a:t>Split data</a:t>
+            </a:r>
+          </a:p>
         </p:txBody>
       </p:sp>
       <p:cxnSp>
@@ -12309,9 +12221,9 @@
           <p:nvPr/>
         </p:nvCxnSpPr>
         <p:spPr>
-          <a:xfrm flipV="1">
-            <a:off x="5324112" y="3608175"/>
-            <a:ext cx="1074690" cy="665"/>
+          <a:xfrm>
+            <a:off x="4887381" y="3607268"/>
+            <a:ext cx="543848" cy="0"/>
           </a:xfrm>
           <a:prstGeom prst="straightConnector1">
             <a:avLst/>
@@ -12337,13 +12249,13 @@
       </p:cxnSp>
       <p:sp>
         <p:nvSpPr>
-          <p:cNvPr id="64" name="TextBox 63"/>
+          <p:cNvPr id="66" name="TextBox 65"/>
           <p:cNvSpPr txBox="1"/>
           <p:nvPr/>
         </p:nvSpPr>
         <p:spPr>
           <a:xfrm>
-            <a:off x="5279251" y="3365696"/>
+            <a:off x="4919425" y="3365031"/>
             <a:ext cx="559769" cy="253916"/>
           </a:xfrm>
           <a:prstGeom prst="rect">
@@ -12366,13 +12278,13 @@
       </p:sp>
       <p:sp>
         <p:nvSpPr>
-          <p:cNvPr id="66" name="TextBox 65"/>
+          <p:cNvPr id="67" name="TextBox 66"/>
           <p:cNvSpPr txBox="1"/>
           <p:nvPr/>
         </p:nvSpPr>
         <p:spPr>
           <a:xfrm>
-            <a:off x="5919842" y="3365696"/>
+            <a:off x="5763466" y="2865258"/>
             <a:ext cx="559769" cy="253916"/>
           </a:xfrm>
           <a:prstGeom prst="rect">
@@ -12395,78 +12307,13 @@
       </p:sp>
       <p:sp>
         <p:nvSpPr>
-          <p:cNvPr id="67" name="TextBox 66"/>
-          <p:cNvSpPr txBox="1"/>
-          <p:nvPr/>
-        </p:nvSpPr>
-        <p:spPr>
-          <a:xfrm>
-            <a:off x="6633825" y="3112694"/>
-            <a:ext cx="559769" cy="253916"/>
-          </a:xfrm>
-          <a:prstGeom prst="rect">
-            <a:avLst/>
-          </a:prstGeom>
-          <a:noFill/>
-        </p:spPr>
-        <p:txBody>
-          <a:bodyPr wrap="none" rtlCol="0">
-            <a:spAutoFit/>
-          </a:bodyPr>
-          <a:lstStyle/>
-          <a:p>
-            <a:r>
-              <a:rPr lang="en-US" sz="1050" dirty="0"/>
-              <a:t>Order</a:t>
-            </a:r>
-          </a:p>
-        </p:txBody>
-      </p:sp>
-      <p:cxnSp>
-        <p:nvCxnSpPr>
-          <p:cNvPr id="70" name="Elbow Connector 69"/>
-          <p:cNvCxnSpPr>
-            <a:stCxn id="61" idx="0"/>
-            <a:endCxn id="71" idx="2"/>
-          </p:cNvCxnSpPr>
-          <p:nvPr/>
-        </p:nvCxnSpPr>
-        <p:spPr>
-          <a:xfrm rot="5400000" flipH="1" flipV="1">
-            <a:off x="6201204" y="2183805"/>
-            <a:ext cx="1943102" cy="419350"/>
-          </a:xfrm>
-          <a:prstGeom prst="bentConnector2">
-            <a:avLst/>
-          </a:prstGeom>
-          <a:ln>
-            <a:tailEnd type="triangle"/>
-          </a:ln>
-        </p:spPr>
-        <p:style>
-          <a:lnRef idx="1">
-            <a:schemeClr val="accent1"/>
-          </a:lnRef>
-          <a:fillRef idx="0">
-            <a:schemeClr val="accent1"/>
-          </a:fillRef>
-          <a:effectRef idx="0">
-            <a:schemeClr val="accent1"/>
-          </a:effectRef>
-          <a:fontRef idx="minor">
-            <a:schemeClr val="tx1"/>
-          </a:fontRef>
-        </p:style>
-      </p:cxnSp>
-      <p:sp>
-        <p:nvSpPr>
           <p:cNvPr id="71" name="Can 70"/>
           <p:cNvSpPr/>
           <p:nvPr/>
         </p:nvSpPr>
         <p:spPr>
           <a:xfrm>
-            <a:off x="7382430" y="1169901"/>
+            <a:off x="6043351" y="2205878"/>
             <a:ext cx="936104" cy="504056"/>
           </a:xfrm>
           <a:prstGeom prst="can">
@@ -12502,43 +12349,14 @@
       </p:sp>
       <p:sp>
         <p:nvSpPr>
-          <p:cNvPr id="73" name="TextBox 72"/>
-          <p:cNvSpPr txBox="1"/>
-          <p:nvPr/>
-        </p:nvSpPr>
-        <p:spPr>
-          <a:xfrm>
-            <a:off x="6845524" y="1169901"/>
-            <a:ext cx="559769" cy="253916"/>
-          </a:xfrm>
-          <a:prstGeom prst="rect">
-            <a:avLst/>
-          </a:prstGeom>
-          <a:noFill/>
-        </p:spPr>
-        <p:txBody>
-          <a:bodyPr wrap="none" rtlCol="0">
-            <a:spAutoFit/>
-          </a:bodyPr>
-          <a:lstStyle/>
-          <a:p>
-            <a:r>
-              <a:rPr lang="en-US" sz="1050" dirty="0"/>
-              <a:t>Order</a:t>
-            </a:r>
-          </a:p>
-        </p:txBody>
-      </p:sp>
-      <p:sp>
-        <p:nvSpPr>
           <p:cNvPr id="77" name="Rectangle 76"/>
           <p:cNvSpPr/>
           <p:nvPr/>
         </p:nvSpPr>
         <p:spPr>
           <a:xfrm>
-            <a:off x="8590960" y="2837689"/>
-            <a:ext cx="1128556" cy="486288"/>
+            <a:off x="7310570" y="3362341"/>
+            <a:ext cx="2109560" cy="486288"/>
           </a:xfrm>
           <a:prstGeom prst="rect">
             <a:avLst/>
@@ -12565,17 +12383,16 @@
             <a:pPr algn="ctr"/>
             <a:r>
               <a:rPr lang="en-US" sz="1050" dirty="0" err="1"/>
-              <a:t>BlockTrans</a:t>
+              <a:t>BlockTransformation</a:t>
             </a:r>
             <a:endParaRPr lang="en-US" sz="1050" dirty="0"/>
           </a:p>
           <a:p>
             <a:pPr algn="ctr"/>
             <a:r>
-              <a:rPr lang="en-US" sz="1050" dirty="0" err="1"/>
-              <a:t>RateCustomer</a:t>
-            </a:r>
-            <a:endParaRPr lang="en-US" sz="1050" dirty="0"/>
+              <a:rPr lang="en-US" sz="1050" dirty="0"/>
+              <a:t>Rate Customer by total amount</a:t>
+            </a:r>
           </a:p>
         </p:txBody>
       </p:sp>
@@ -12583,6 +12400,7 @@
         <p:nvCxnSpPr>
           <p:cNvPr id="79" name="Straight Arrow Connector 78"/>
           <p:cNvCxnSpPr>
+            <a:cxnSpLocks/>
             <a:stCxn id="61" idx="3"/>
             <a:endCxn id="77" idx="1"/>
           </p:cNvCxnSpPr>
@@ -12590,8 +12408,8 @@
         </p:nvCxnSpPr>
         <p:spPr>
           <a:xfrm flipV="1">
-            <a:off x="7527358" y="3080833"/>
-            <a:ext cx="1063602" cy="527342"/>
+            <a:off x="6559785" y="3605485"/>
+            <a:ext cx="750785" cy="1783"/>
           </a:xfrm>
           <a:prstGeom prst="straightConnector1">
             <a:avLst/>
@@ -12617,13 +12435,13 @@
       </p:cxnSp>
       <p:sp>
         <p:nvSpPr>
-          <p:cNvPr id="80" name="TextBox 79"/>
+          <p:cNvPr id="83" name="TextBox 82"/>
           <p:cNvSpPr txBox="1"/>
           <p:nvPr/>
         </p:nvSpPr>
         <p:spPr>
           <a:xfrm>
-            <a:off x="7460057" y="3366610"/>
+            <a:off x="6688968" y="3373421"/>
             <a:ext cx="559769" cy="253916"/>
           </a:xfrm>
           <a:prstGeom prst="rect">
@@ -12644,98 +12462,20 @@
           </a:p>
         </p:txBody>
       </p:sp>
-      <p:sp>
-        <p:nvSpPr>
-          <p:cNvPr id="83" name="TextBox 82"/>
-          <p:cNvSpPr txBox="1"/>
-          <p:nvPr/>
-        </p:nvSpPr>
-        <p:spPr>
-          <a:xfrm>
-            <a:off x="8132110" y="2813713"/>
-            <a:ext cx="559769" cy="253916"/>
-          </a:xfrm>
-          <a:prstGeom prst="rect">
-            <a:avLst/>
-          </a:prstGeom>
-          <a:noFill/>
-        </p:spPr>
-        <p:txBody>
-          <a:bodyPr wrap="none" rtlCol="0">
-            <a:spAutoFit/>
-          </a:bodyPr>
-          <a:lstStyle/>
-          <a:p>
-            <a:r>
-              <a:rPr lang="en-US" sz="1050" dirty="0"/>
-              <a:t>Order</a:t>
-            </a:r>
-          </a:p>
-        </p:txBody>
-      </p:sp>
-      <p:sp>
-        <p:nvSpPr>
-          <p:cNvPr id="86" name="Rectangle 85"/>
-          <p:cNvSpPr/>
-          <p:nvPr/>
-        </p:nvSpPr>
-        <p:spPr>
-          <a:xfrm>
-            <a:off x="8462597" y="3945400"/>
-            <a:ext cx="1382384" cy="585939"/>
-          </a:xfrm>
-          <a:prstGeom prst="rect">
-            <a:avLst/>
-          </a:prstGeom>
-        </p:spPr>
-        <p:style>
-          <a:lnRef idx="2">
-            <a:schemeClr val="accent1"/>
-          </a:lnRef>
-          <a:fillRef idx="1">
-            <a:schemeClr val="lt1"/>
-          </a:fillRef>
-          <a:effectRef idx="0">
-            <a:schemeClr val="accent1"/>
-          </a:effectRef>
-          <a:fontRef idx="minor">
-            <a:schemeClr val="dk1"/>
-          </a:fontRef>
-        </p:style>
-        <p:txBody>
-          <a:bodyPr rtlCol="0" anchor="ctr"/>
-          <a:lstStyle/>
-          <a:p>
-            <a:pPr algn="ctr"/>
-            <a:r>
-              <a:rPr lang="en-US" sz="1050" dirty="0" err="1"/>
-              <a:t>RowTrans</a:t>
-            </a:r>
-            <a:endParaRPr lang="en-US" sz="1050" dirty="0"/>
-          </a:p>
-          <a:p>
-            <a:pPr algn="ctr"/>
-            <a:r>
-              <a:rPr lang="en-US" sz="1050" dirty="0" err="1"/>
-              <a:t>OrderIntoRating</a:t>
-            </a:r>
-            <a:endParaRPr lang="en-US" sz="1050" dirty="0"/>
-          </a:p>
-        </p:txBody>
-      </p:sp>
       <p:cxnSp>
         <p:nvCxnSpPr>
           <p:cNvPr id="88" name="Straight Arrow Connector 87"/>
           <p:cNvCxnSpPr>
+            <a:cxnSpLocks/>
             <a:stCxn id="77" idx="2"/>
-            <a:endCxn id="86" idx="0"/>
+            <a:endCxn id="110" idx="1"/>
           </p:cNvCxnSpPr>
           <p:nvPr/>
         </p:nvCxnSpPr>
         <p:spPr>
-          <a:xfrm flipH="1">
-            <a:off x="9153789" y="3323977"/>
-            <a:ext cx="1449" cy="621423"/>
+          <a:xfrm>
+            <a:off x="8365350" y="3848629"/>
+            <a:ext cx="0" cy="649661"/>
           </a:xfrm>
           <a:prstGeom prst="straightConnector1">
             <a:avLst/>
@@ -12761,45 +12501,16 @@
       </p:cxnSp>
       <p:sp>
         <p:nvSpPr>
-          <p:cNvPr id="93" name="TextBox 92"/>
-          <p:cNvSpPr txBox="1"/>
-          <p:nvPr/>
-        </p:nvSpPr>
-        <p:spPr>
-          <a:xfrm>
-            <a:off x="9155238" y="3283826"/>
-            <a:ext cx="559769" cy="253916"/>
-          </a:xfrm>
-          <a:prstGeom prst="rect">
-            <a:avLst/>
-          </a:prstGeom>
-          <a:noFill/>
-        </p:spPr>
-        <p:txBody>
-          <a:bodyPr wrap="none" rtlCol="0">
-            <a:spAutoFit/>
-          </a:bodyPr>
-          <a:lstStyle/>
-          <a:p>
-            <a:r>
-              <a:rPr lang="en-US" sz="1050" dirty="0"/>
-              <a:t>Order</a:t>
-            </a:r>
-          </a:p>
-        </p:txBody>
-      </p:sp>
-      <p:sp>
-        <p:nvSpPr>
-          <p:cNvPr id="97" name="Rectangle 96"/>
+          <p:cNvPr id="110" name="Can 109"/>
           <p:cNvSpPr/>
           <p:nvPr/>
         </p:nvSpPr>
         <p:spPr>
           <a:xfrm>
-            <a:off x="10921241" y="2828918"/>
-            <a:ext cx="1128556" cy="486288"/>
+            <a:off x="7897298" y="4498290"/>
+            <a:ext cx="936104" cy="504056"/>
           </a:xfrm>
-          <a:prstGeom prst="rect">
+          <a:prstGeom prst="can">
             <a:avLst/>
           </a:prstGeom>
         </p:spPr>
@@ -12823,32 +12534,62 @@
           <a:p>
             <a:pPr algn="ctr"/>
             <a:r>
+              <a:rPr lang="en-US" sz="1050" dirty="0" err="1"/>
+              <a:t>DBDest</a:t>
+            </a:r>
+            <a:endParaRPr lang="en-US" sz="1050" dirty="0"/>
+          </a:p>
+        </p:txBody>
+      </p:sp>
+      <p:sp>
+        <p:nvSpPr>
+          <p:cNvPr id="115" name="TextBox 114"/>
+          <p:cNvSpPr txBox="1"/>
+          <p:nvPr/>
+        </p:nvSpPr>
+        <p:spPr>
+          <a:xfrm>
+            <a:off x="8406411" y="4021946"/>
+            <a:ext cx="601447" cy="253916"/>
+          </a:xfrm>
+          <a:prstGeom prst="rect">
+            <a:avLst/>
+          </a:prstGeom>
+          <a:noFill/>
+        </p:spPr>
+        <p:txBody>
+          <a:bodyPr wrap="none" rtlCol="0">
+            <a:spAutoFit/>
+          </a:bodyPr>
+          <a:lstStyle/>
+          <a:p>
+            <a:r>
               <a:rPr lang="en-US" sz="1050" dirty="0"/>
-              <a:t>Custom Sink</a:t>
-            </a:r>
-          </a:p>
-          <a:p>
-            <a:pPr algn="ctr"/>
-            <a:r>
-              <a:rPr lang="en-US" sz="1050" dirty="0"/>
-              <a:t>&gt; null</a:t>
+              <a:t>Rating</a:t>
             </a:r>
           </a:p>
         </p:txBody>
       </p:sp>
       <p:cxnSp>
         <p:nvCxnSpPr>
-          <p:cNvPr id="99" name="Straight Arrow Connector 98"/>
+          <p:cNvPr id="72" name="Straight Arrow Connector 71">
+            <a:extLst>
+              <a:ext uri="{FF2B5EF4-FFF2-40B4-BE49-F238E27FC236}">
+                <a16:creationId xmlns:a16="http://schemas.microsoft.com/office/drawing/2014/main" id="{1C5B6442-D5D0-2347-A4D3-BF17F0EFDD99}"/>
+              </a:ext>
+            </a:extLst>
+          </p:cNvPr>
           <p:cNvCxnSpPr>
-            <a:stCxn id="77" idx="3"/>
-            <a:endCxn id="97" idx="1"/>
+            <a:cxnSpLocks/>
+            <a:stCxn id="61" idx="0"/>
+            <a:endCxn id="71" idx="3"/>
           </p:cNvCxnSpPr>
           <p:nvPr/>
         </p:nvCxnSpPr>
         <p:spPr>
           <a:xfrm flipV="1">
-            <a:off x="9719516" y="3072062"/>
-            <a:ext cx="1201725" cy="8771"/>
+            <a:off x="5995507" y="2709934"/>
+            <a:ext cx="515896" cy="654190"/>
           </a:xfrm>
           <a:prstGeom prst="straightConnector1">
             <a:avLst/>
@@ -12872,295 +12613,6 @@
           </a:fontRef>
         </p:style>
       </p:cxnSp>
-      <p:sp>
-        <p:nvSpPr>
-          <p:cNvPr id="100" name="TextBox 99"/>
-          <p:cNvSpPr txBox="1"/>
-          <p:nvPr/>
-        </p:nvSpPr>
-        <p:spPr>
-          <a:xfrm>
-            <a:off x="9666377" y="2815556"/>
-            <a:ext cx="559769" cy="253916"/>
-          </a:xfrm>
-          <a:prstGeom prst="rect">
-            <a:avLst/>
-          </a:prstGeom>
-          <a:noFill/>
-        </p:spPr>
-        <p:txBody>
-          <a:bodyPr wrap="none" rtlCol="0">
-            <a:spAutoFit/>
-          </a:bodyPr>
-          <a:lstStyle/>
-          <a:p>
-            <a:r>
-              <a:rPr lang="en-US" sz="1050" dirty="0"/>
-              <a:t>Order</a:t>
-            </a:r>
-          </a:p>
-        </p:txBody>
-      </p:sp>
-      <p:sp>
-        <p:nvSpPr>
-          <p:cNvPr id="101" name="TextBox 100"/>
-          <p:cNvSpPr txBox="1"/>
-          <p:nvPr/>
-        </p:nvSpPr>
-        <p:spPr>
-          <a:xfrm>
-            <a:off x="10410183" y="2800164"/>
-            <a:ext cx="559769" cy="253916"/>
-          </a:xfrm>
-          <a:prstGeom prst="rect">
-            <a:avLst/>
-          </a:prstGeom>
-          <a:noFill/>
-        </p:spPr>
-        <p:txBody>
-          <a:bodyPr wrap="none" rtlCol="0">
-            <a:spAutoFit/>
-          </a:bodyPr>
-          <a:lstStyle/>
-          <a:p>
-            <a:r>
-              <a:rPr lang="en-US" sz="1050" dirty="0"/>
-              <a:t>Order</a:t>
-            </a:r>
-          </a:p>
-        </p:txBody>
-      </p:sp>
-      <p:sp>
-        <p:nvSpPr>
-          <p:cNvPr id="102" name="TextBox 101"/>
-          <p:cNvSpPr txBox="1"/>
-          <p:nvPr/>
-        </p:nvSpPr>
-        <p:spPr>
-          <a:xfrm>
-            <a:off x="9779202" y="3175084"/>
-            <a:ext cx="1117614" cy="253916"/>
-          </a:xfrm>
-          <a:prstGeom prst="rect">
-            <a:avLst/>
-          </a:prstGeom>
-          <a:noFill/>
-        </p:spPr>
-        <p:txBody>
-          <a:bodyPr wrap="none" rtlCol="0">
-            <a:spAutoFit/>
-          </a:bodyPr>
-          <a:lstStyle/>
-          <a:p>
-            <a:r>
-              <a:rPr lang="en-US" sz="1050" dirty="0">
-                <a:solidFill>
-                  <a:srgbClr val="FF0000"/>
-                </a:solidFill>
-              </a:rPr>
-              <a:t>Rating == null</a:t>
-            </a:r>
-          </a:p>
-        </p:txBody>
-      </p:sp>
-      <p:sp>
-        <p:nvSpPr>
-          <p:cNvPr id="105" name="TextBox 104"/>
-          <p:cNvSpPr txBox="1"/>
-          <p:nvPr/>
-        </p:nvSpPr>
-        <p:spPr>
-          <a:xfrm>
-            <a:off x="9153789" y="3690121"/>
-            <a:ext cx="559769" cy="253916"/>
-          </a:xfrm>
-          <a:prstGeom prst="rect">
-            <a:avLst/>
-          </a:prstGeom>
-          <a:noFill/>
-        </p:spPr>
-        <p:txBody>
-          <a:bodyPr wrap="none" rtlCol="0">
-            <a:spAutoFit/>
-          </a:bodyPr>
-          <a:lstStyle/>
-          <a:p>
-            <a:r>
-              <a:rPr lang="en-US" sz="1050" dirty="0"/>
-              <a:t>Order</a:t>
-            </a:r>
-          </a:p>
-        </p:txBody>
-      </p:sp>
-      <p:sp>
-        <p:nvSpPr>
-          <p:cNvPr id="110" name="Can 109"/>
-          <p:cNvSpPr/>
-          <p:nvPr/>
-        </p:nvSpPr>
-        <p:spPr>
-          <a:xfrm>
-            <a:off x="9435122" y="4931284"/>
-            <a:ext cx="936104" cy="504056"/>
-          </a:xfrm>
-          <a:prstGeom prst="can">
-            <a:avLst/>
-          </a:prstGeom>
-        </p:spPr>
-        <p:style>
-          <a:lnRef idx="2">
-            <a:schemeClr val="accent1"/>
-          </a:lnRef>
-          <a:fillRef idx="1">
-            <a:schemeClr val="lt1"/>
-          </a:fillRef>
-          <a:effectRef idx="0">
-            <a:schemeClr val="accent1"/>
-          </a:effectRef>
-          <a:fontRef idx="minor">
-            <a:schemeClr val="dk1"/>
-          </a:fontRef>
-        </p:style>
-        <p:txBody>
-          <a:bodyPr rtlCol="0" anchor="ctr"/>
-          <a:lstStyle/>
-          <a:p>
-            <a:pPr algn="ctr"/>
-            <a:r>
-              <a:rPr lang="en-US" sz="1050" dirty="0" err="1"/>
-              <a:t>DBDest</a:t>
-            </a:r>
-            <a:endParaRPr lang="en-US" sz="1050" dirty="0"/>
-          </a:p>
-        </p:txBody>
-      </p:sp>
-      <p:cxnSp>
-        <p:nvCxnSpPr>
-          <p:cNvPr id="112" name="Straight Arrow Connector 111"/>
-          <p:cNvCxnSpPr>
-            <a:stCxn id="86" idx="2"/>
-            <a:endCxn id="110" idx="1"/>
-          </p:cNvCxnSpPr>
-          <p:nvPr/>
-        </p:nvCxnSpPr>
-        <p:spPr>
-          <a:xfrm>
-            <a:off x="9153789" y="4531339"/>
-            <a:ext cx="749385" cy="399945"/>
-          </a:xfrm>
-          <a:prstGeom prst="straightConnector1">
-            <a:avLst/>
-          </a:prstGeom>
-          <a:ln>
-            <a:tailEnd type="triangle"/>
-          </a:ln>
-        </p:spPr>
-        <p:style>
-          <a:lnRef idx="1">
-            <a:schemeClr val="accent1"/>
-          </a:lnRef>
-          <a:fillRef idx="0">
-            <a:schemeClr val="accent1"/>
-          </a:fillRef>
-          <a:effectRef idx="0">
-            <a:schemeClr val="accent1"/>
-          </a:effectRef>
-          <a:fontRef idx="minor">
-            <a:schemeClr val="tx1"/>
-          </a:fontRef>
-        </p:style>
-      </p:cxnSp>
-      <p:sp>
-        <p:nvSpPr>
-          <p:cNvPr id="114" name="TextBox 113"/>
-          <p:cNvSpPr txBox="1"/>
-          <p:nvPr/>
-        </p:nvSpPr>
-        <p:spPr>
-          <a:xfrm>
-            <a:off x="9272630" y="4469050"/>
-            <a:ext cx="601447" cy="253916"/>
-          </a:xfrm>
-          <a:prstGeom prst="rect">
-            <a:avLst/>
-          </a:prstGeom>
-          <a:noFill/>
-        </p:spPr>
-        <p:txBody>
-          <a:bodyPr wrap="none" rtlCol="0">
-            <a:spAutoFit/>
-          </a:bodyPr>
-          <a:lstStyle/>
-          <a:p>
-            <a:r>
-              <a:rPr lang="en-US" sz="1050" dirty="0"/>
-              <a:t>Rating</a:t>
-            </a:r>
-          </a:p>
-        </p:txBody>
-      </p:sp>
-      <p:sp>
-        <p:nvSpPr>
-          <p:cNvPr id="115" name="TextBox 114"/>
-          <p:cNvSpPr txBox="1"/>
-          <p:nvPr/>
-        </p:nvSpPr>
-        <p:spPr>
-          <a:xfrm>
-            <a:off x="9779202" y="4698024"/>
-            <a:ext cx="601447" cy="253916"/>
-          </a:xfrm>
-          <a:prstGeom prst="rect">
-            <a:avLst/>
-          </a:prstGeom>
-          <a:noFill/>
-        </p:spPr>
-        <p:txBody>
-          <a:bodyPr wrap="none" rtlCol="0">
-            <a:spAutoFit/>
-          </a:bodyPr>
-          <a:lstStyle/>
-          <a:p>
-            <a:r>
-              <a:rPr lang="en-US" sz="1050" dirty="0"/>
-              <a:t>Rating</a:t>
-            </a:r>
-          </a:p>
-        </p:txBody>
-      </p:sp>
-      <p:sp>
-        <p:nvSpPr>
-          <p:cNvPr id="116" name="TextBox 115"/>
-          <p:cNvSpPr txBox="1"/>
-          <p:nvPr/>
-        </p:nvSpPr>
-        <p:spPr>
-          <a:xfrm>
-            <a:off x="8468575" y="3437110"/>
-            <a:ext cx="1059906" cy="253916"/>
-          </a:xfrm>
-          <a:prstGeom prst="rect">
-            <a:avLst/>
-          </a:prstGeom>
-          <a:noFill/>
-        </p:spPr>
-        <p:txBody>
-          <a:bodyPr wrap="none" rtlCol="0">
-            <a:spAutoFit/>
-          </a:bodyPr>
-          <a:lstStyle/>
-          <a:p>
-            <a:r>
-              <a:rPr lang="en-US" sz="1050" dirty="0">
-                <a:solidFill>
-                  <a:srgbClr val="FF0000"/>
-                </a:solidFill>
-              </a:rPr>
-              <a:t>Rating != null</a:t>
-            </a:r>
-          </a:p>
-        </p:txBody>
-      </p:sp>
     </p:spTree>
     <p:extLst>
       <p:ext uri="{BB962C8B-B14F-4D97-AF65-F5344CB8AC3E}">
@@ -13335,60 +12787,15 @@
                                   </p:childTnLst>
                                 </p:cTn>
                               </p:par>
-                            </p:childTnLst>
-                          </p:cTn>
-                        </p:par>
-                      </p:childTnLst>
-                    </p:cTn>
-                  </p:par>
-                  <p:par>
-                    <p:cTn id="17" fill="hold">
-                      <p:stCondLst>
-                        <p:cond delay="indefinite"/>
-                      </p:stCondLst>
-                      <p:childTnLst>
-                        <p:par>
-                          <p:cTn id="18" fill="hold">
-                            <p:stCondLst>
-                              <p:cond delay="0"/>
-                            </p:stCondLst>
-                            <p:childTnLst>
                               <p:par>
-                                <p:cTn id="19" presetID="1" presetClass="entr" presetSubtype="0" fill="hold" grpId="0" nodeType="clickEffect">
+                                <p:cTn id="17" presetID="1" presetClass="entr" presetSubtype="0" fill="hold" grpId="0" nodeType="withEffect">
                                   <p:stCondLst>
                                     <p:cond delay="0"/>
                                   </p:stCondLst>
                                   <p:childTnLst>
                                     <p:set>
                                       <p:cBhvr>
-                                        <p:cTn id="20" dur="1" fill="hold">
-                                          <p:stCondLst>
-                                            <p:cond delay="0"/>
-                                          </p:stCondLst>
-                                        </p:cTn>
-                                        <p:tgtEl>
-                                          <p:spTgt spid="48"/>
-                                        </p:tgtEl>
-                                        <p:attrNameLst>
-                                          <p:attrName>style.visibility</p:attrName>
-                                        </p:attrNameLst>
-                                      </p:cBhvr>
-                                      <p:to>
-                                        <p:strVal val="visible"/>
-                                      </p:to>
-                                    </p:set>
-                                  </p:childTnLst>
-                                </p:cTn>
-                              </p:par>
-                              <p:par>
-                                <p:cTn id="21" presetID="1" presetClass="entr" presetSubtype="0" fill="hold" grpId="0" nodeType="withEffect">
-                                  <p:stCondLst>
-                                    <p:cond delay="0"/>
-                                  </p:stCondLst>
-                                  <p:childTnLst>
-                                    <p:set>
-                                      <p:cBhvr>
-                                        <p:cTn id="22" dur="1" fill="hold">
+                                        <p:cTn id="18" dur="1" fill="hold">
                                           <p:stCondLst>
                                             <p:cond delay="0"/>
                                           </p:stCondLst>
@@ -13414,26 +12821,26 @@
                     </p:cTn>
                   </p:par>
                   <p:par>
-                    <p:cTn id="23" fill="hold">
+                    <p:cTn id="19" fill="hold">
                       <p:stCondLst>
                         <p:cond delay="indefinite"/>
                       </p:stCondLst>
                       <p:childTnLst>
                         <p:par>
-                          <p:cTn id="24" fill="hold">
+                          <p:cTn id="20" fill="hold">
                             <p:stCondLst>
                               <p:cond delay="0"/>
                             </p:stCondLst>
                             <p:childTnLst>
                               <p:par>
-                                <p:cTn id="25" presetID="1" presetClass="entr" presetSubtype="0" fill="hold" nodeType="clickEffect">
+                                <p:cTn id="21" presetID="1" presetClass="entr" presetSubtype="0" fill="hold" nodeType="clickEffect">
                                   <p:stCondLst>
                                     <p:cond delay="0"/>
                                   </p:stCondLst>
                                   <p:childTnLst>
                                     <p:set>
                                       <p:cBhvr>
-                                        <p:cTn id="26" dur="1" fill="hold">
+                                        <p:cTn id="22" dur="1" fill="hold">
                                           <p:stCondLst>
                                             <p:cond delay="0"/>
                                           </p:stCondLst>
@@ -13453,14 +12860,14 @@
                                 </p:cTn>
                               </p:par>
                               <p:par>
-                                <p:cTn id="27" presetID="1" presetClass="entr" presetSubtype="0" fill="hold" nodeType="withEffect">
+                                <p:cTn id="23" presetID="1" presetClass="entr" presetSubtype="0" fill="hold" nodeType="withEffect">
                                   <p:stCondLst>
                                     <p:cond delay="0"/>
                                   </p:stCondLst>
                                   <p:childTnLst>
                                     <p:set>
                                       <p:cBhvr>
-                                        <p:cTn id="28" dur="1" fill="hold">
+                                        <p:cTn id="24" dur="1" fill="hold">
                                           <p:stCondLst>
                                             <p:cond delay="0"/>
                                           </p:stCondLst>
@@ -13480,7 +12887,61 @@
                                 </p:cTn>
                               </p:par>
                               <p:par>
-                                <p:cTn id="29" presetID="1" presetClass="entr" presetSubtype="0" fill="hold" grpId="0" nodeType="withEffect">
+                                <p:cTn id="25" presetID="1" presetClass="entr" presetSubtype="0" fill="hold" grpId="0" nodeType="withEffect">
+                                  <p:stCondLst>
+                                    <p:cond delay="0"/>
+                                  </p:stCondLst>
+                                  <p:childTnLst>
+                                    <p:set>
+                                      <p:cBhvr>
+                                        <p:cTn id="26" dur="1" fill="hold">
+                                          <p:stCondLst>
+                                            <p:cond delay="0"/>
+                                          </p:stCondLst>
+                                        </p:cTn>
+                                        <p:tgtEl>
+                                          <p:spTgt spid="38"/>
+                                        </p:tgtEl>
+                                        <p:attrNameLst>
+                                          <p:attrName>style.visibility</p:attrName>
+                                        </p:attrNameLst>
+                                      </p:cBhvr>
+                                      <p:to>
+                                        <p:strVal val="visible"/>
+                                      </p:to>
+                                    </p:set>
+                                  </p:childTnLst>
+                                </p:cTn>
+                              </p:par>
+                              <p:par>
+                                <p:cTn id="27" presetID="1" presetClass="entr" presetSubtype="0" fill="hold" grpId="0" nodeType="withEffect">
+                                  <p:stCondLst>
+                                    <p:cond delay="0"/>
+                                  </p:stCondLst>
+                                  <p:childTnLst>
+                                    <p:set>
+                                      <p:cBhvr>
+                                        <p:cTn id="28" dur="1" fill="hold">
+                                          <p:stCondLst>
+                                            <p:cond delay="0"/>
+                                          </p:stCondLst>
+                                        </p:cTn>
+                                        <p:tgtEl>
+                                          <p:spTgt spid="49"/>
+                                        </p:tgtEl>
+                                        <p:attrNameLst>
+                                          <p:attrName>style.visibility</p:attrName>
+                                        </p:attrNameLst>
+                                      </p:cBhvr>
+                                      <p:to>
+                                        <p:strVal val="visible"/>
+                                      </p:to>
+                                    </p:set>
+                                  </p:childTnLst>
+                                </p:cTn>
+                              </p:par>
+                              <p:par>
+                                <p:cTn id="29" presetID="1" presetClass="entr" presetSubtype="0" fill="hold" nodeType="withEffect">
                                   <p:stCondLst>
                                     <p:cond delay="0"/>
                                   </p:stCondLst>
@@ -13493,7 +12954,7 @@
                                           </p:stCondLst>
                                         </p:cTn>
                                         <p:tgtEl>
-                                          <p:spTgt spid="38"/>
+                                          <p:spTgt spid="32"/>
                                         </p:tgtEl>
                                         <p:attrNameLst>
                                           <p:attrName>style.visibility</p:attrName>
@@ -13520,7 +12981,7 @@
                                           </p:stCondLst>
                                         </p:cTn>
                                         <p:tgtEl>
-                                          <p:spTgt spid="49"/>
+                                          <p:spTgt spid="57"/>
                                         </p:tgtEl>
                                         <p:attrNameLst>
                                           <p:attrName>style.visibility</p:attrName>
@@ -13547,7 +13008,7 @@
                                           </p:stCondLst>
                                         </p:cTn>
                                         <p:tgtEl>
-                                          <p:spTgt spid="51"/>
+                                          <p:spTgt spid="36"/>
                                         </p:tgtEl>
                                         <p:attrNameLst>
                                           <p:attrName>style.visibility</p:attrName>
@@ -13561,7 +13022,7 @@
                                 </p:cTn>
                               </p:par>
                               <p:par>
-                                <p:cTn id="35" presetID="1" presetClass="entr" presetSubtype="0" fill="hold" grpId="0" nodeType="withEffect">
+                                <p:cTn id="35" presetID="1" presetClass="entr" presetSubtype="0" fill="hold" nodeType="withEffect">
                                   <p:stCondLst>
                                     <p:cond delay="0"/>
                                   </p:stCondLst>
@@ -13574,7 +13035,7 @@
                                           </p:stCondLst>
                                         </p:cTn>
                                         <p:tgtEl>
-                                          <p:spTgt spid="58"/>
+                                          <p:spTgt spid="63"/>
                                         </p:tgtEl>
                                         <p:attrNameLst>
                                           <p:attrName>style.visibility</p:attrName>
@@ -13588,7 +13049,7 @@
                                 </p:cTn>
                               </p:par>
                               <p:par>
-                                <p:cTn id="37" presetID="1" presetClass="entr" presetSubtype="0" fill="hold" nodeType="withEffect">
+                                <p:cTn id="37" presetID="1" presetClass="entr" presetSubtype="0" fill="hold" grpId="0" nodeType="withEffect">
                                   <p:stCondLst>
                                     <p:cond delay="0"/>
                                   </p:stCondLst>
@@ -13601,7 +13062,7 @@
                                           </p:stCondLst>
                                         </p:cTn>
                                         <p:tgtEl>
-                                          <p:spTgt spid="32"/>
+                                          <p:spTgt spid="66"/>
                                         </p:tgtEl>
                                         <p:attrNameLst>
                                           <p:attrName>style.visibility</p:attrName>
@@ -13628,7 +13089,7 @@
                                           </p:stCondLst>
                                         </p:cTn>
                                         <p:tgtEl>
-                                          <p:spTgt spid="57"/>
+                                          <p:spTgt spid="61"/>
                                         </p:tgtEl>
                                         <p:attrNameLst>
                                           <p:attrName>style.visibility</p:attrName>
@@ -13655,7 +13116,7 @@
                                           </p:stCondLst>
                                         </p:cTn>
                                         <p:tgtEl>
-                                          <p:spTgt spid="36"/>
+                                          <p:spTgt spid="67"/>
                                         </p:tgtEl>
                                         <p:attrNameLst>
                                           <p:attrName>style.visibility</p:attrName>
@@ -13668,26 +13129,35 @@
                                   </p:childTnLst>
                                 </p:cTn>
                               </p:par>
-                            </p:childTnLst>
-                          </p:cTn>
-                        </p:par>
-                      </p:childTnLst>
-                    </p:cTn>
-                  </p:par>
-                  <p:par>
-                    <p:cTn id="43" fill="hold">
-                      <p:stCondLst>
-                        <p:cond delay="indefinite"/>
-                      </p:stCondLst>
-                      <p:childTnLst>
-                        <p:par>
-                          <p:cTn id="44" fill="hold">
-                            <p:stCondLst>
-                              <p:cond delay="0"/>
-                            </p:stCondLst>
-                            <p:childTnLst>
                               <p:par>
-                                <p:cTn id="45" presetID="1" presetClass="entr" presetSubtype="0" fill="hold" grpId="0" nodeType="clickEffect">
+                                <p:cTn id="43" presetID="1" presetClass="entr" presetSubtype="0" fill="hold" grpId="0" nodeType="withEffect">
+                                  <p:stCondLst>
+                                    <p:cond delay="0"/>
+                                  </p:stCondLst>
+                                  <p:childTnLst>
+                                    <p:set>
+                                      <p:cBhvr>
+                                        <p:cTn id="44" dur="1" fill="hold">
+                                          <p:stCondLst>
+                                            <p:cond delay="0"/>
+                                          </p:stCondLst>
+                                        </p:cTn>
+                                        <p:tgtEl>
+                                          <p:spTgt spid="71"/>
+                                        </p:tgtEl>
+                                        <p:attrNameLst>
+                                          <p:attrName>style.visibility</p:attrName>
+                                        </p:attrNameLst>
+                                      </p:cBhvr>
+                                      <p:to>
+                                        <p:strVal val="visible"/>
+                                      </p:to>
+                                    </p:set>
+                                  </p:childTnLst>
+                                </p:cTn>
+                              </p:par>
+                              <p:par>
+                                <p:cTn id="45" presetID="1" presetClass="entr" presetSubtype="0" fill="hold" nodeType="withEffect">
                                   <p:stCondLst>
                                     <p:cond delay="0"/>
                                   </p:stCondLst>
@@ -13700,7 +13170,7 @@
                                           </p:stCondLst>
                                         </p:cTn>
                                         <p:tgtEl>
-                                          <p:spTgt spid="64"/>
+                                          <p:spTgt spid="7"/>
                                         </p:tgtEl>
                                         <p:attrNameLst>
                                           <p:attrName>style.visibility</p:attrName>
@@ -13727,7 +13197,7 @@
                                           </p:stCondLst>
                                         </p:cTn>
                                         <p:tgtEl>
-                                          <p:spTgt spid="63"/>
+                                          <p:spTgt spid="79"/>
                                         </p:tgtEl>
                                         <p:attrNameLst>
                                           <p:attrName>style.visibility</p:attrName>
@@ -13754,7 +13224,7 @@
                                           </p:stCondLst>
                                         </p:cTn>
                                         <p:tgtEl>
-                                          <p:spTgt spid="66"/>
+                                          <p:spTgt spid="83"/>
                                         </p:tgtEl>
                                         <p:attrNameLst>
                                           <p:attrName>style.visibility</p:attrName>
@@ -13781,7 +13251,7 @@
                                           </p:stCondLst>
                                         </p:cTn>
                                         <p:tgtEl>
-                                          <p:spTgt spid="61"/>
+                                          <p:spTgt spid="77"/>
                                         </p:tgtEl>
                                         <p:attrNameLst>
                                           <p:attrName>style.visibility</p:attrName>
@@ -13826,7 +13296,7 @@
                                           </p:stCondLst>
                                         </p:cTn>
                                         <p:tgtEl>
-                                          <p:spTgt spid="70"/>
+                                          <p:spTgt spid="88"/>
                                         </p:tgtEl>
                                         <p:attrNameLst>
                                           <p:attrName>style.visibility</p:attrName>
@@ -13853,7 +13323,7 @@
                                           </p:stCondLst>
                                         </p:cTn>
                                         <p:tgtEl>
-                                          <p:spTgt spid="67"/>
+                                          <p:spTgt spid="115"/>
                                         </p:tgtEl>
                                         <p:attrNameLst>
                                           <p:attrName>style.visibility</p:attrName>
@@ -13880,7 +13350,7 @@
                                           </p:stCondLst>
                                         </p:cTn>
                                         <p:tgtEl>
-                                          <p:spTgt spid="73"/>
+                                          <p:spTgt spid="110"/>
                                         </p:tgtEl>
                                         <p:attrNameLst>
                                           <p:attrName>style.visibility</p:attrName>
@@ -13894,7 +13364,7 @@
                                 </p:cTn>
                               </p:par>
                               <p:par>
-                                <p:cTn id="61" presetID="1" presetClass="entr" presetSubtype="0" fill="hold" grpId="0" nodeType="withEffect">
+                                <p:cTn id="61" presetID="1" presetClass="entr" presetSubtype="0" fill="hold" nodeType="withEffect">
                                   <p:stCondLst>
                                     <p:cond delay="0"/>
                                   </p:stCondLst>
@@ -13907,7 +13377,7 @@
                                           </p:stCondLst>
                                         </p:cTn>
                                         <p:tgtEl>
-                                          <p:spTgt spid="71"/>
+                                          <p:spTgt spid="6"/>
                                         </p:tgtEl>
                                         <p:attrNameLst>
                                           <p:attrName>style.visibility</p:attrName>
@@ -13934,592 +13404,7 @@
                                           </p:stCondLst>
                                         </p:cTn>
                                         <p:tgtEl>
-                                          <p:spTgt spid="7"/>
-                                        </p:tgtEl>
-                                        <p:attrNameLst>
-                                          <p:attrName>style.visibility</p:attrName>
-                                        </p:attrNameLst>
-                                      </p:cBhvr>
-                                      <p:to>
-                                        <p:strVal val="visible"/>
-                                      </p:to>
-                                    </p:set>
-                                  </p:childTnLst>
-                                </p:cTn>
-                              </p:par>
-                            </p:childTnLst>
-                          </p:cTn>
-                        </p:par>
-                      </p:childTnLst>
-                    </p:cTn>
-                  </p:par>
-                  <p:par>
-                    <p:cTn id="65" fill="hold">
-                      <p:stCondLst>
-                        <p:cond delay="indefinite"/>
-                      </p:stCondLst>
-                      <p:childTnLst>
-                        <p:par>
-                          <p:cTn id="66" fill="hold">
-                            <p:stCondLst>
-                              <p:cond delay="0"/>
-                            </p:stCondLst>
-                            <p:childTnLst>
-                              <p:par>
-                                <p:cTn id="67" presetID="1" presetClass="entr" presetSubtype="0" fill="hold" grpId="0" nodeType="clickEffect">
-                                  <p:stCondLst>
-                                    <p:cond delay="0"/>
-                                  </p:stCondLst>
-                                  <p:childTnLst>
-                                    <p:set>
-                                      <p:cBhvr>
-                                        <p:cTn id="68" dur="1" fill="hold">
-                                          <p:stCondLst>
-                                            <p:cond delay="0"/>
-                                          </p:stCondLst>
-                                        </p:cTn>
-                                        <p:tgtEl>
-                                          <p:spTgt spid="80"/>
-                                        </p:tgtEl>
-                                        <p:attrNameLst>
-                                          <p:attrName>style.visibility</p:attrName>
-                                        </p:attrNameLst>
-                                      </p:cBhvr>
-                                      <p:to>
-                                        <p:strVal val="visible"/>
-                                      </p:to>
-                                    </p:set>
-                                  </p:childTnLst>
-                                </p:cTn>
-                              </p:par>
-                              <p:par>
-                                <p:cTn id="69" presetID="1" presetClass="entr" presetSubtype="0" fill="hold" nodeType="withEffect">
-                                  <p:stCondLst>
-                                    <p:cond delay="0"/>
-                                  </p:stCondLst>
-                                  <p:childTnLst>
-                                    <p:set>
-                                      <p:cBhvr>
-                                        <p:cTn id="70" dur="1" fill="hold">
-                                          <p:stCondLst>
-                                            <p:cond delay="0"/>
-                                          </p:stCondLst>
-                                        </p:cTn>
-                                        <p:tgtEl>
-                                          <p:spTgt spid="79"/>
-                                        </p:tgtEl>
-                                        <p:attrNameLst>
-                                          <p:attrName>style.visibility</p:attrName>
-                                        </p:attrNameLst>
-                                      </p:cBhvr>
-                                      <p:to>
-                                        <p:strVal val="visible"/>
-                                      </p:to>
-                                    </p:set>
-                                  </p:childTnLst>
-                                </p:cTn>
-                              </p:par>
-                              <p:par>
-                                <p:cTn id="71" presetID="1" presetClass="entr" presetSubtype="0" fill="hold" grpId="0" nodeType="withEffect">
-                                  <p:stCondLst>
-                                    <p:cond delay="0"/>
-                                  </p:stCondLst>
-                                  <p:childTnLst>
-                                    <p:set>
-                                      <p:cBhvr>
-                                        <p:cTn id="72" dur="1" fill="hold">
-                                          <p:stCondLst>
-                                            <p:cond delay="0"/>
-                                          </p:stCondLst>
-                                        </p:cTn>
-                                        <p:tgtEl>
-                                          <p:spTgt spid="83"/>
-                                        </p:tgtEl>
-                                        <p:attrNameLst>
-                                          <p:attrName>style.visibility</p:attrName>
-                                        </p:attrNameLst>
-                                      </p:cBhvr>
-                                      <p:to>
-                                        <p:strVal val="visible"/>
-                                      </p:to>
-                                    </p:set>
-                                  </p:childTnLst>
-                                </p:cTn>
-                              </p:par>
-                              <p:par>
-                                <p:cTn id="73" presetID="1" presetClass="entr" presetSubtype="0" fill="hold" grpId="0" nodeType="withEffect">
-                                  <p:stCondLst>
-                                    <p:cond delay="0"/>
-                                  </p:stCondLst>
-                                  <p:childTnLst>
-                                    <p:set>
-                                      <p:cBhvr>
-                                        <p:cTn id="74" dur="1" fill="hold">
-                                          <p:stCondLst>
-                                            <p:cond delay="0"/>
-                                          </p:stCondLst>
-                                        </p:cTn>
-                                        <p:tgtEl>
-                                          <p:spTgt spid="77"/>
-                                        </p:tgtEl>
-                                        <p:attrNameLst>
-                                          <p:attrName>style.visibility</p:attrName>
-                                        </p:attrNameLst>
-                                      </p:cBhvr>
-                                      <p:to>
-                                        <p:strVal val="visible"/>
-                                      </p:to>
-                                    </p:set>
-                                  </p:childTnLst>
-                                </p:cTn>
-                              </p:par>
-                            </p:childTnLst>
-                          </p:cTn>
-                        </p:par>
-                      </p:childTnLst>
-                    </p:cTn>
-                  </p:par>
-                  <p:par>
-                    <p:cTn id="75" fill="hold">
-                      <p:stCondLst>
-                        <p:cond delay="indefinite"/>
-                      </p:stCondLst>
-                      <p:childTnLst>
-                        <p:par>
-                          <p:cTn id="76" fill="hold">
-                            <p:stCondLst>
-                              <p:cond delay="0"/>
-                            </p:stCondLst>
-                            <p:childTnLst>
-                              <p:par>
-                                <p:cTn id="77" presetID="1" presetClass="entr" presetSubtype="0" fill="hold" grpId="0" nodeType="clickEffect">
-                                  <p:stCondLst>
-                                    <p:cond delay="0"/>
-                                  </p:stCondLst>
-                                  <p:childTnLst>
-                                    <p:set>
-                                      <p:cBhvr>
-                                        <p:cTn id="78" dur="1" fill="hold">
-                                          <p:stCondLst>
-                                            <p:cond delay="0"/>
-                                          </p:stCondLst>
-                                        </p:cTn>
-                                        <p:tgtEl>
-                                          <p:spTgt spid="102"/>
-                                        </p:tgtEl>
-                                        <p:attrNameLst>
-                                          <p:attrName>style.visibility</p:attrName>
-                                        </p:attrNameLst>
-                                      </p:cBhvr>
-                                      <p:to>
-                                        <p:strVal val="visible"/>
-                                      </p:to>
-                                    </p:set>
-                                  </p:childTnLst>
-                                </p:cTn>
-                              </p:par>
-                              <p:par>
-                                <p:cTn id="79" presetID="1" presetClass="entr" presetSubtype="0" fill="hold" grpId="0" nodeType="withEffect">
-                                  <p:stCondLst>
-                                    <p:cond delay="0"/>
-                                  </p:stCondLst>
-                                  <p:childTnLst>
-                                    <p:set>
-                                      <p:cBhvr>
-                                        <p:cTn id="80" dur="1" fill="hold">
-                                          <p:stCondLst>
-                                            <p:cond delay="0"/>
-                                          </p:stCondLst>
-                                        </p:cTn>
-                                        <p:tgtEl>
-                                          <p:spTgt spid="100"/>
-                                        </p:tgtEl>
-                                        <p:attrNameLst>
-                                          <p:attrName>style.visibility</p:attrName>
-                                        </p:attrNameLst>
-                                      </p:cBhvr>
-                                      <p:to>
-                                        <p:strVal val="visible"/>
-                                      </p:to>
-                                    </p:set>
-                                  </p:childTnLst>
-                                </p:cTn>
-                              </p:par>
-                              <p:par>
-                                <p:cTn id="81" presetID="1" presetClass="entr" presetSubtype="0" fill="hold" grpId="0" nodeType="withEffect">
-                                  <p:stCondLst>
-                                    <p:cond delay="0"/>
-                                  </p:stCondLst>
-                                  <p:childTnLst>
-                                    <p:set>
-                                      <p:cBhvr>
-                                        <p:cTn id="82" dur="1" fill="hold">
-                                          <p:stCondLst>
-                                            <p:cond delay="0"/>
-                                          </p:stCondLst>
-                                        </p:cTn>
-                                        <p:tgtEl>
-                                          <p:spTgt spid="101"/>
-                                        </p:tgtEl>
-                                        <p:attrNameLst>
-                                          <p:attrName>style.visibility</p:attrName>
-                                        </p:attrNameLst>
-                                      </p:cBhvr>
-                                      <p:to>
-                                        <p:strVal val="visible"/>
-                                      </p:to>
-                                    </p:set>
-                                  </p:childTnLst>
-                                </p:cTn>
-                              </p:par>
-                              <p:par>
-                                <p:cTn id="83" presetID="1" presetClass="entr" presetSubtype="0" fill="hold" grpId="0" nodeType="withEffect">
-                                  <p:stCondLst>
-                                    <p:cond delay="0"/>
-                                  </p:stCondLst>
-                                  <p:childTnLst>
-                                    <p:set>
-                                      <p:cBhvr>
-                                        <p:cTn id="84" dur="1" fill="hold">
-                                          <p:stCondLst>
-                                            <p:cond delay="0"/>
-                                          </p:stCondLst>
-                                        </p:cTn>
-                                        <p:tgtEl>
-                                          <p:spTgt spid="97"/>
-                                        </p:tgtEl>
-                                        <p:attrNameLst>
-                                          <p:attrName>style.visibility</p:attrName>
-                                        </p:attrNameLst>
-                                      </p:cBhvr>
-                                      <p:to>
-                                        <p:strVal val="visible"/>
-                                      </p:to>
-                                    </p:set>
-                                  </p:childTnLst>
-                                </p:cTn>
-                              </p:par>
-                              <p:par>
-                                <p:cTn id="85" presetID="1" presetClass="entr" presetSubtype="0" fill="hold" nodeType="withEffect">
-                                  <p:stCondLst>
-                                    <p:cond delay="0"/>
-                                  </p:stCondLst>
-                                  <p:childTnLst>
-                                    <p:set>
-                                      <p:cBhvr>
-                                        <p:cTn id="86" dur="1" fill="hold">
-                                          <p:stCondLst>
-                                            <p:cond delay="0"/>
-                                          </p:stCondLst>
-                                        </p:cTn>
-                                        <p:tgtEl>
-                                          <p:spTgt spid="99"/>
-                                        </p:tgtEl>
-                                        <p:attrNameLst>
-                                          <p:attrName>style.visibility</p:attrName>
-                                        </p:attrNameLst>
-                                      </p:cBhvr>
-                                      <p:to>
-                                        <p:strVal val="visible"/>
-                                      </p:to>
-                                    </p:set>
-                                  </p:childTnLst>
-                                </p:cTn>
-                              </p:par>
-                            </p:childTnLst>
-                          </p:cTn>
-                        </p:par>
-                      </p:childTnLst>
-                    </p:cTn>
-                  </p:par>
-                  <p:par>
-                    <p:cTn id="87" fill="hold">
-                      <p:stCondLst>
-                        <p:cond delay="indefinite"/>
-                      </p:stCondLst>
-                      <p:childTnLst>
-                        <p:par>
-                          <p:cTn id="88" fill="hold">
-                            <p:stCondLst>
-                              <p:cond delay="0"/>
-                            </p:stCondLst>
-                            <p:childTnLst>
-                              <p:par>
-                                <p:cTn id="89" presetID="1" presetClass="entr" presetSubtype="0" fill="hold" nodeType="clickEffect">
-                                  <p:stCondLst>
-                                    <p:cond delay="0"/>
-                                  </p:stCondLst>
-                                  <p:childTnLst>
-                                    <p:set>
-                                      <p:cBhvr>
-                                        <p:cTn id="90" dur="1" fill="hold">
-                                          <p:stCondLst>
-                                            <p:cond delay="0"/>
-                                          </p:stCondLst>
-                                        </p:cTn>
-                                        <p:tgtEl>
-                                          <p:spTgt spid="88"/>
-                                        </p:tgtEl>
-                                        <p:attrNameLst>
-                                          <p:attrName>style.visibility</p:attrName>
-                                        </p:attrNameLst>
-                                      </p:cBhvr>
-                                      <p:to>
-                                        <p:strVal val="visible"/>
-                                      </p:to>
-                                    </p:set>
-                                  </p:childTnLst>
-                                </p:cTn>
-                              </p:par>
-                              <p:par>
-                                <p:cTn id="91" presetID="1" presetClass="entr" presetSubtype="0" fill="hold" grpId="0" nodeType="withEffect">
-                                  <p:stCondLst>
-                                    <p:cond delay="0"/>
-                                  </p:stCondLst>
-                                  <p:childTnLst>
-                                    <p:set>
-                                      <p:cBhvr>
-                                        <p:cTn id="92" dur="1" fill="hold">
-                                          <p:stCondLst>
-                                            <p:cond delay="0"/>
-                                          </p:stCondLst>
-                                        </p:cTn>
-                                        <p:tgtEl>
-                                          <p:spTgt spid="116"/>
-                                        </p:tgtEl>
-                                        <p:attrNameLst>
-                                          <p:attrName>style.visibility</p:attrName>
-                                        </p:attrNameLst>
-                                      </p:cBhvr>
-                                      <p:to>
-                                        <p:strVal val="visible"/>
-                                      </p:to>
-                                    </p:set>
-                                  </p:childTnLst>
-                                </p:cTn>
-                              </p:par>
-                              <p:par>
-                                <p:cTn id="93" presetID="1" presetClass="entr" presetSubtype="0" fill="hold" grpId="0" nodeType="withEffect">
-                                  <p:stCondLst>
-                                    <p:cond delay="0"/>
-                                  </p:stCondLst>
-                                  <p:childTnLst>
-                                    <p:set>
-                                      <p:cBhvr>
-                                        <p:cTn id="94" dur="1" fill="hold">
-                                          <p:stCondLst>
-                                            <p:cond delay="0"/>
-                                          </p:stCondLst>
-                                        </p:cTn>
-                                        <p:tgtEl>
-                                          <p:spTgt spid="93"/>
-                                        </p:tgtEl>
-                                        <p:attrNameLst>
-                                          <p:attrName>style.visibility</p:attrName>
-                                        </p:attrNameLst>
-                                      </p:cBhvr>
-                                      <p:to>
-                                        <p:strVal val="visible"/>
-                                      </p:to>
-                                    </p:set>
-                                  </p:childTnLst>
-                                </p:cTn>
-                              </p:par>
-                              <p:par>
-                                <p:cTn id="95" presetID="1" presetClass="entr" presetSubtype="0" fill="hold" grpId="0" nodeType="withEffect">
-                                  <p:stCondLst>
-                                    <p:cond delay="0"/>
-                                  </p:stCondLst>
-                                  <p:childTnLst>
-                                    <p:set>
-                                      <p:cBhvr>
-                                        <p:cTn id="96" dur="1" fill="hold">
-                                          <p:stCondLst>
-                                            <p:cond delay="0"/>
-                                          </p:stCondLst>
-                                        </p:cTn>
-                                        <p:tgtEl>
-                                          <p:spTgt spid="105"/>
-                                        </p:tgtEl>
-                                        <p:attrNameLst>
-                                          <p:attrName>style.visibility</p:attrName>
-                                        </p:attrNameLst>
-                                      </p:cBhvr>
-                                      <p:to>
-                                        <p:strVal val="visible"/>
-                                      </p:to>
-                                    </p:set>
-                                  </p:childTnLst>
-                                </p:cTn>
-                              </p:par>
-                              <p:par>
-                                <p:cTn id="97" presetID="1" presetClass="entr" presetSubtype="0" fill="hold" grpId="0" nodeType="withEffect">
-                                  <p:stCondLst>
-                                    <p:cond delay="0"/>
-                                  </p:stCondLst>
-                                  <p:childTnLst>
-                                    <p:set>
-                                      <p:cBhvr>
-                                        <p:cTn id="98" dur="1" fill="hold">
-                                          <p:stCondLst>
-                                            <p:cond delay="0"/>
-                                          </p:stCondLst>
-                                        </p:cTn>
-                                        <p:tgtEl>
-                                          <p:spTgt spid="86"/>
-                                        </p:tgtEl>
-                                        <p:attrNameLst>
-                                          <p:attrName>style.visibility</p:attrName>
-                                        </p:attrNameLst>
-                                      </p:cBhvr>
-                                      <p:to>
-                                        <p:strVal val="visible"/>
-                                      </p:to>
-                                    </p:set>
-                                  </p:childTnLst>
-                                </p:cTn>
-                              </p:par>
-                            </p:childTnLst>
-                          </p:cTn>
-                        </p:par>
-                      </p:childTnLst>
-                    </p:cTn>
-                  </p:par>
-                  <p:par>
-                    <p:cTn id="99" fill="hold">
-                      <p:stCondLst>
-                        <p:cond delay="indefinite"/>
-                      </p:stCondLst>
-                      <p:childTnLst>
-                        <p:par>
-                          <p:cTn id="100" fill="hold">
-                            <p:stCondLst>
-                              <p:cond delay="0"/>
-                            </p:stCondLst>
-                            <p:childTnLst>
-                              <p:par>
-                                <p:cTn id="101" presetID="1" presetClass="entr" presetSubtype="0" fill="hold" grpId="0" nodeType="clickEffect">
-                                  <p:stCondLst>
-                                    <p:cond delay="0"/>
-                                  </p:stCondLst>
-                                  <p:childTnLst>
-                                    <p:set>
-                                      <p:cBhvr>
-                                        <p:cTn id="102" dur="1" fill="hold">
-                                          <p:stCondLst>
-                                            <p:cond delay="0"/>
-                                          </p:stCondLst>
-                                        </p:cTn>
-                                        <p:tgtEl>
-                                          <p:spTgt spid="114"/>
-                                        </p:tgtEl>
-                                        <p:attrNameLst>
-                                          <p:attrName>style.visibility</p:attrName>
-                                        </p:attrNameLst>
-                                      </p:cBhvr>
-                                      <p:to>
-                                        <p:strVal val="visible"/>
-                                      </p:to>
-                                    </p:set>
-                                  </p:childTnLst>
-                                </p:cTn>
-                              </p:par>
-                              <p:par>
-                                <p:cTn id="103" presetID="1" presetClass="entr" presetSubtype="0" fill="hold" nodeType="withEffect">
-                                  <p:stCondLst>
-                                    <p:cond delay="0"/>
-                                  </p:stCondLst>
-                                  <p:childTnLst>
-                                    <p:set>
-                                      <p:cBhvr>
-                                        <p:cTn id="104" dur="1" fill="hold">
-                                          <p:stCondLst>
-                                            <p:cond delay="0"/>
-                                          </p:stCondLst>
-                                        </p:cTn>
-                                        <p:tgtEl>
-                                          <p:spTgt spid="112"/>
-                                        </p:tgtEl>
-                                        <p:attrNameLst>
-                                          <p:attrName>style.visibility</p:attrName>
-                                        </p:attrNameLst>
-                                      </p:cBhvr>
-                                      <p:to>
-                                        <p:strVal val="visible"/>
-                                      </p:to>
-                                    </p:set>
-                                  </p:childTnLst>
-                                </p:cTn>
-                              </p:par>
-                              <p:par>
-                                <p:cTn id="105" presetID="1" presetClass="entr" presetSubtype="0" fill="hold" grpId="0" nodeType="withEffect">
-                                  <p:stCondLst>
-                                    <p:cond delay="0"/>
-                                  </p:stCondLst>
-                                  <p:childTnLst>
-                                    <p:set>
-                                      <p:cBhvr>
-                                        <p:cTn id="106" dur="1" fill="hold">
-                                          <p:stCondLst>
-                                            <p:cond delay="0"/>
-                                          </p:stCondLst>
-                                        </p:cTn>
-                                        <p:tgtEl>
-                                          <p:spTgt spid="115"/>
-                                        </p:tgtEl>
-                                        <p:attrNameLst>
-                                          <p:attrName>style.visibility</p:attrName>
-                                        </p:attrNameLst>
-                                      </p:cBhvr>
-                                      <p:to>
-                                        <p:strVal val="visible"/>
-                                      </p:to>
-                                    </p:set>
-                                  </p:childTnLst>
-                                </p:cTn>
-                              </p:par>
-                              <p:par>
-                                <p:cTn id="107" presetID="1" presetClass="entr" presetSubtype="0" fill="hold" grpId="0" nodeType="withEffect">
-                                  <p:stCondLst>
-                                    <p:cond delay="0"/>
-                                  </p:stCondLst>
-                                  <p:childTnLst>
-                                    <p:set>
-                                      <p:cBhvr>
-                                        <p:cTn id="108" dur="1" fill="hold">
-                                          <p:stCondLst>
-                                            <p:cond delay="0"/>
-                                          </p:stCondLst>
-                                        </p:cTn>
-                                        <p:tgtEl>
-                                          <p:spTgt spid="110"/>
-                                        </p:tgtEl>
-                                        <p:attrNameLst>
-                                          <p:attrName>style.visibility</p:attrName>
-                                        </p:attrNameLst>
-                                      </p:cBhvr>
-                                      <p:to>
-                                        <p:strVal val="visible"/>
-                                      </p:to>
-                                    </p:set>
-                                  </p:childTnLst>
-                                </p:cTn>
-                              </p:par>
-                              <p:par>
-                                <p:cTn id="109" presetID="1" presetClass="entr" presetSubtype="0" fill="hold" nodeType="withEffect">
-                                  <p:stCondLst>
-                                    <p:cond delay="0"/>
-                                  </p:stCondLst>
-                                  <p:childTnLst>
-                                    <p:set>
-                                      <p:cBhvr>
-                                        <p:cTn id="110" dur="1" fill="hold">
-                                          <p:stCondLst>
-                                            <p:cond delay="0"/>
-                                          </p:stCondLst>
-                                        </p:cTn>
-                                        <p:tgtEl>
-                                          <p:spTgt spid="6"/>
+                                          <p:spTgt spid="72"/>
                                         </p:tgtEl>
                                         <p:attrNameLst>
                                           <p:attrName>style.visibility</p:attrName>
@@ -14565,31 +13450,16 @@
       <p:bldP spid="37" grpId="0" animBg="1"/>
       <p:bldP spid="38" grpId="0" animBg="1"/>
       <p:bldP spid="47" grpId="0"/>
-      <p:bldP spid="48" grpId="0"/>
       <p:bldP spid="49" grpId="0"/>
-      <p:bldP spid="51" grpId="0"/>
       <p:bldP spid="57" grpId="0"/>
-      <p:bldP spid="58" grpId="0"/>
       <p:bldP spid="61" grpId="0" animBg="1"/>
-      <p:bldP spid="64" grpId="0"/>
       <p:bldP spid="66" grpId="0"/>
       <p:bldP spid="67" grpId="0"/>
       <p:bldP spid="71" grpId="0" animBg="1"/>
-      <p:bldP spid="73" grpId="0"/>
       <p:bldP spid="77" grpId="0" animBg="1"/>
-      <p:bldP spid="80" grpId="0"/>
       <p:bldP spid="83" grpId="0"/>
-      <p:bldP spid="86" grpId="0" animBg="1"/>
-      <p:bldP spid="93" grpId="0"/>
-      <p:bldP spid="97" grpId="0" animBg="1"/>
-      <p:bldP spid="100" grpId="0"/>
-      <p:bldP spid="101" grpId="0"/>
-      <p:bldP spid="102" grpId="0"/>
-      <p:bldP spid="105" grpId="0"/>
       <p:bldP spid="110" grpId="0" animBg="1"/>
-      <p:bldP spid="114" grpId="0"/>
       <p:bldP spid="115" grpId="0"/>
-      <p:bldP spid="116" grpId="0"/>
     </p:bldLst>
   </p:timing>
 </p:sld>

</xml_diff>